<commit_message>
minor updates to ppt format
</commit_message>
<xml_diff>
--- a/presentations/Chapter_10-Layered_Arch.pptx
+++ b/presentations/Chapter_10-Layered_Arch.pptx
@@ -112,6 +112,11 @@
       </a:defRPr>
     </a:lvl9pPr>
   </p:defaultTextStyle>
+  <p:extLst>
+    <p:ext uri="{EFAFB233-063F-42B5-8137-9DF3F51BA10A}">
+      <p15:sldGuideLst xmlns:p15="http://schemas.microsoft.com/office/powerpoint/2012/main"/>
+    </p:ext>
+  </p:extLst>
 </p:presentation>
 </file>
 
@@ -895,7 +900,7 @@
             <a:defRPr cap="all"/>
           </a:pPr>
           <a:r>
-            <a:rPr lang="en-US"/>
+            <a:rPr lang="en-US" cap="none" baseline="0" dirty="0"/>
             <a:t>One of the most commonly used “architectures”</a:t>
           </a:r>
         </a:p>
@@ -934,7 +939,7 @@
             <a:defRPr cap="all"/>
           </a:pPr>
           <a:r>
-            <a:rPr lang="en-US"/>
+            <a:rPr lang="en-US" cap="none" baseline="0" dirty="0"/>
             <a:t>Known for its simplicity, familiarity, and low cost</a:t>
           </a:r>
         </a:p>
@@ -973,7 +978,7 @@
             <a:defRPr cap="all"/>
           </a:pPr>
           <a:r>
-            <a:rPr lang="en-US"/>
+            <a:rPr lang="en-US" cap="none" baseline="0" dirty="0"/>
             <a:t>Used in both monolithic and distributed systems</a:t>
           </a:r>
         </a:p>
@@ -1335,7 +1340,7 @@
         </a:bodyPr>
         <a:lstStyle/>
         <a:p>
-          <a:pPr marL="0" lvl="0" indent="0" algn="ctr" defTabSz="755650">
+          <a:pPr marL="0" lvl="0" indent="0" algn="ctr" defTabSz="844550">
             <a:lnSpc>
               <a:spcPct val="90000"/>
             </a:lnSpc>
@@ -1349,7 +1354,7 @@
             <a:defRPr cap="all"/>
           </a:pPr>
           <a:r>
-            <a:rPr lang="en-US" sz="1700" kern="1200"/>
+            <a:rPr lang="en-US" sz="1900" kern="1200" cap="none" baseline="0" dirty="0"/>
             <a:t>One of the most commonly used “architectures”</a:t>
           </a:r>
         </a:p>
@@ -1484,7 +1489,7 @@
         </a:bodyPr>
         <a:lstStyle/>
         <a:p>
-          <a:pPr marL="0" lvl="0" indent="0" algn="ctr" defTabSz="755650">
+          <a:pPr marL="0" lvl="0" indent="0" algn="ctr" defTabSz="844550">
             <a:lnSpc>
               <a:spcPct val="90000"/>
             </a:lnSpc>
@@ -1498,7 +1503,7 @@
             <a:defRPr cap="all"/>
           </a:pPr>
           <a:r>
-            <a:rPr lang="en-US" sz="1700" kern="1200"/>
+            <a:rPr lang="en-US" sz="1900" kern="1200" cap="none" baseline="0" dirty="0"/>
             <a:t>Known for its simplicity, familiarity, and low cost</a:t>
           </a:r>
         </a:p>
@@ -1633,7 +1638,7 @@
         </a:bodyPr>
         <a:lstStyle/>
         <a:p>
-          <a:pPr marL="0" lvl="0" indent="0" algn="ctr" defTabSz="755650">
+          <a:pPr marL="0" lvl="0" indent="0" algn="ctr" defTabSz="844550">
             <a:lnSpc>
               <a:spcPct val="90000"/>
             </a:lnSpc>
@@ -1647,7 +1652,7 @@
             <a:defRPr cap="all"/>
           </a:pPr>
           <a:r>
-            <a:rPr lang="en-US" sz="1700" kern="1200"/>
+            <a:rPr lang="en-US" sz="1900" kern="1200" cap="none" baseline="0" dirty="0"/>
             <a:t>Used in both monolithic and distributed systems</a:t>
           </a:r>
         </a:p>
@@ -3412,7 +3417,7 @@
           <a:p>
             <a:fld id="{65FECEE2-7432-4C81-94F9-EC8C03872F3C}" type="datetimeFigureOut">
               <a:rPr lang="en-US" smtClean="0"/>
-              <a:t>9/2/2025</a:t>
+              <a:t>9/5/2025</a:t>
             </a:fld>
             <a:endParaRPr lang="en-US"/>
           </a:p>
@@ -3708,7 +3713,7 @@
           <a:p>
             <a:fld id="{65FECEE2-7432-4C81-94F9-EC8C03872F3C}" type="datetimeFigureOut">
               <a:rPr lang="en-US" smtClean="0"/>
-              <a:t>9/2/2025</a:t>
+              <a:t>9/5/2025</a:t>
             </a:fld>
             <a:endParaRPr lang="en-US"/>
           </a:p>
@@ -3956,7 +3961,7 @@
           <a:p>
             <a:fld id="{65FECEE2-7432-4C81-94F9-EC8C03872F3C}" type="datetimeFigureOut">
               <a:rPr lang="en-US" smtClean="0"/>
-              <a:t>9/2/2025</a:t>
+              <a:t>9/5/2025</a:t>
             </a:fld>
             <a:endParaRPr lang="en-US"/>
           </a:p>
@@ -4496,7 +4501,7 @@
           <a:p>
             <a:fld id="{65FECEE2-7432-4C81-94F9-EC8C03872F3C}" type="datetimeFigureOut">
               <a:rPr lang="en-US" smtClean="0"/>
-              <a:t>9/2/2025</a:t>
+              <a:t>9/5/2025</a:t>
             </a:fld>
             <a:endParaRPr lang="en-US"/>
           </a:p>
@@ -4744,7 +4749,7 @@
           <a:p>
             <a:fld id="{65FECEE2-7432-4C81-94F9-EC8C03872F3C}" type="datetimeFigureOut">
               <a:rPr lang="en-US" smtClean="0"/>
-              <a:t>9/2/2025</a:t>
+              <a:t>9/5/2025</a:t>
             </a:fld>
             <a:endParaRPr lang="en-US"/>
           </a:p>
@@ -5276,7 +5281,7 @@
           <a:p>
             <a:fld id="{65FECEE2-7432-4C81-94F9-EC8C03872F3C}" type="datetimeFigureOut">
               <a:rPr lang="en-US" smtClean="0"/>
-              <a:t>9/2/2025</a:t>
+              <a:t>9/5/2025</a:t>
             </a:fld>
             <a:endParaRPr lang="en-US"/>
           </a:p>
@@ -5573,7 +5578,7 @@
           <a:p>
             <a:fld id="{65FECEE2-7432-4C81-94F9-EC8C03872F3C}" type="datetimeFigureOut">
               <a:rPr lang="en-US" smtClean="0"/>
-              <a:t>9/2/2025</a:t>
+              <a:t>9/5/2025</a:t>
             </a:fld>
             <a:endParaRPr lang="en-US"/>
           </a:p>
@@ -5747,7 +5752,7 @@
           <a:p>
             <a:fld id="{65FECEE2-7432-4C81-94F9-EC8C03872F3C}" type="datetimeFigureOut">
               <a:rPr lang="en-US" smtClean="0"/>
-              <a:t>9/2/2025</a:t>
+              <a:t>9/5/2025</a:t>
             </a:fld>
             <a:endParaRPr lang="en-US"/>
           </a:p>
@@ -5927,7 +5932,7 @@
           <a:p>
             <a:fld id="{65FECEE2-7432-4C81-94F9-EC8C03872F3C}" type="datetimeFigureOut">
               <a:rPr lang="en-US" smtClean="0"/>
-              <a:t>9/2/2025</a:t>
+              <a:t>9/5/2025</a:t>
             </a:fld>
             <a:endParaRPr lang="en-US"/>
           </a:p>
@@ -6097,7 +6102,7 @@
           <a:p>
             <a:fld id="{65FECEE2-7432-4C81-94F9-EC8C03872F3C}" type="datetimeFigureOut">
               <a:rPr lang="en-US" smtClean="0"/>
-              <a:t>9/2/2025</a:t>
+              <a:t>9/5/2025</a:t>
             </a:fld>
             <a:endParaRPr lang="en-US"/>
           </a:p>
@@ -6348,7 +6353,7 @@
           <a:p>
             <a:fld id="{65FECEE2-7432-4C81-94F9-EC8C03872F3C}" type="datetimeFigureOut">
               <a:rPr lang="en-US" smtClean="0"/>
-              <a:t>9/2/2025</a:t>
+              <a:t>9/5/2025</a:t>
             </a:fld>
             <a:endParaRPr lang="en-US"/>
           </a:p>
@@ -6645,7 +6650,7 @@
           <a:p>
             <a:fld id="{65FECEE2-7432-4C81-94F9-EC8C03872F3C}" type="datetimeFigureOut">
               <a:rPr lang="en-US" smtClean="0"/>
-              <a:t>9/2/2025</a:t>
+              <a:t>9/5/2025</a:t>
             </a:fld>
             <a:endParaRPr lang="en-US"/>
           </a:p>
@@ -7087,7 +7092,7 @@
           <a:p>
             <a:fld id="{65FECEE2-7432-4C81-94F9-EC8C03872F3C}" type="datetimeFigureOut">
               <a:rPr lang="en-US" smtClean="0"/>
-              <a:t>9/2/2025</a:t>
+              <a:t>9/5/2025</a:t>
             </a:fld>
             <a:endParaRPr lang="en-US"/>
           </a:p>
@@ -7205,7 +7210,7 @@
           <a:p>
             <a:fld id="{65FECEE2-7432-4C81-94F9-EC8C03872F3C}" type="datetimeFigureOut">
               <a:rPr lang="en-US" smtClean="0"/>
-              <a:t>9/2/2025</a:t>
+              <a:t>9/5/2025</a:t>
             </a:fld>
             <a:endParaRPr lang="en-US"/>
           </a:p>
@@ -7300,7 +7305,7 @@
           <a:p>
             <a:fld id="{65FECEE2-7432-4C81-94F9-EC8C03872F3C}" type="datetimeFigureOut">
               <a:rPr lang="en-US" smtClean="0"/>
-              <a:t>9/2/2025</a:t>
+              <a:t>9/5/2025</a:t>
             </a:fld>
             <a:endParaRPr lang="en-US"/>
           </a:p>
@@ -7583,7 +7588,7 @@
           <a:p>
             <a:fld id="{65FECEE2-7432-4C81-94F9-EC8C03872F3C}" type="datetimeFigureOut">
               <a:rPr lang="en-US" smtClean="0"/>
-              <a:t>9/2/2025</a:t>
+              <a:t>9/5/2025</a:t>
             </a:fld>
             <a:endParaRPr lang="en-US"/>
           </a:p>
@@ -7874,7 +7879,7 @@
           <a:p>
             <a:fld id="{65FECEE2-7432-4C81-94F9-EC8C03872F3C}" type="datetimeFigureOut">
               <a:rPr lang="en-US" smtClean="0"/>
-              <a:t>9/2/2025</a:t>
+              <a:t>9/5/2025</a:t>
             </a:fld>
             <a:endParaRPr lang="en-US"/>
           </a:p>
@@ -8404,7 +8409,7 @@
           <a:p>
             <a:fld id="{65FECEE2-7432-4C81-94F9-EC8C03872F3C}" type="datetimeFigureOut">
               <a:rPr lang="en-US" smtClean="0"/>
-              <a:t>9/2/2025</a:t>
+              <a:t>9/5/2025</a:t>
             </a:fld>
             <a:endParaRPr lang="en-US"/>
           </a:p>
@@ -9431,22 +9436,22 @@
               </a:lnSpc>
             </a:pPr>
             <a:r>
-              <a:rPr lang="en-US" sz="2000"/>
+              <a:rPr lang="en-US" sz="2000" dirty="0"/>
               <a:t>Chapter 10, Fundamentals of Software Architecture </a:t>
             </a:r>
             <a:br>
-              <a:rPr lang="en-US" sz="2000"/>
+              <a:rPr lang="en-US" sz="2000" dirty="0"/>
             </a:br>
             <a:r>
-              <a:rPr lang="en-US" sz="2000"/>
+              <a:rPr lang="en-US" sz="2000" dirty="0"/>
               <a:t>(2</a:t>
             </a:r>
             <a:r>
-              <a:rPr lang="en-US" sz="2000" baseline="30000"/>
+              <a:rPr lang="en-US" sz="2000" baseline="30000" dirty="0"/>
               <a:t>nd</a:t>
             </a:r>
             <a:r>
-              <a:rPr lang="en-US" sz="2000"/>
+              <a:rPr lang="en-US" sz="2000" dirty="0"/>
               <a:t> Edition)</a:t>
             </a:r>
           </a:p>
@@ -9457,8 +9462,8 @@
               </a:lnSpc>
             </a:pPr>
             <a:r>
-              <a:rPr lang="en-US" sz="2000"/>
-              <a:t>Blaine Harris</a:t>
+              <a:rPr lang="en-US" sz="2000" dirty="0"/>
+              <a:t>Presentation: Blaine Harris</a:t>
             </a:r>
           </a:p>
         </p:txBody>
@@ -9747,8 +9752,8 @@
           <a:lstStyle/>
           <a:p>
             <a:r>
-              <a:rPr lang="en-US" dirty="0"/>
-              <a:t>Introduction</a:t>
+              <a:rPr lang="en-US" i="1" cap="small" dirty="0"/>
+              <a:t>Layered (n-tiered) Architecture</a:t>
             </a:r>
           </a:p>
         </p:txBody>
@@ -9769,7 +9774,7 @@
             <p:ph idx="1"/>
             <p:extLst>
               <p:ext uri="{D42A27DB-BD31-4B8C-83A1-F6EECF244321}">
-                <p14:modId xmlns:p14="http://schemas.microsoft.com/office/powerpoint/2010/main" val="3958714006"/>
+                <p14:modId xmlns:p14="http://schemas.microsoft.com/office/powerpoint/2010/main" val="3878047261"/>
               </p:ext>
             </p:extLst>
           </p:nvPr>
@@ -10359,31 +10364,59 @@
         </p:spPr>
         <p:txBody>
           <a:bodyPr>
-            <a:normAutofit/>
+            <a:normAutofit fontScale="92500" lnSpcReduction="20000"/>
           </a:bodyPr>
           <a:lstStyle/>
           <a:p>
             <a:r>
-              <a:rPr lang="en-US"/>
-              <a:t>Presentation – User interface and interaction</a:t>
+              <a:rPr lang="en-US" dirty="0"/>
+              <a:t>Presentation</a:t>
             </a:r>
           </a:p>
           <a:p>
+            <a:pPr lvl="1"/>
             <a:r>
-              <a:rPr lang="en-US"/>
-              <a:t>Business – Contains business rules and logic</a:t>
+              <a:rPr lang="en-US" dirty="0"/>
+              <a:t>User interface and interaction</a:t>
             </a:r>
           </a:p>
           <a:p>
             <a:r>
-              <a:rPr lang="en-US"/>
-              <a:t>Persistence – Manages data access logic</a:t>
+              <a:rPr lang="en-US" dirty="0"/>
+              <a:t>Business</a:t>
             </a:r>
           </a:p>
           <a:p>
+            <a:pPr lvl="1"/>
             <a:r>
-              <a:rPr lang="en-US"/>
-              <a:t>Database – stores raw data</a:t>
+              <a:rPr lang="en-US" dirty="0"/>
+              <a:t>Contains business rules and logic</a:t>
+            </a:r>
+          </a:p>
+          <a:p>
+            <a:r>
+              <a:rPr lang="en-US" dirty="0"/>
+              <a:t>Persistence</a:t>
+            </a:r>
+          </a:p>
+          <a:p>
+            <a:pPr lvl="1"/>
+            <a:r>
+              <a:rPr lang="en-US" dirty="0"/>
+              <a:t>Manages data access logic</a:t>
+            </a:r>
+          </a:p>
+          <a:p>
+            <a:r>
+              <a:rPr lang="en-US" dirty="0"/>
+              <a:t>Database</a:t>
+            </a:r>
+          </a:p>
+          <a:p>
+            <a:pPr lvl="1"/>
+            <a:r>
+              <a:rPr lang="en-US" dirty="0"/>
+              <a:t>Stores raw data</a:t>
             </a:r>
           </a:p>
         </p:txBody>
@@ -13286,7 +13319,7 @@
         </p:nvSpPr>
         <p:spPr>
           <a:xfrm>
-            <a:off x="3962399" y="685800"/>
+            <a:off x="4000499" y="479526"/>
             <a:ext cx="7345891" cy="1413933"/>
           </a:xfrm>
         </p:spPr>
@@ -13298,7 +13331,7 @@
           <a:p>
             <a:r>
               <a:rPr lang="en-US" dirty="0"/>
-              <a:t>Applicability</a:t>
+              <a:t>Applicability of Layered Architecture</a:t>
             </a:r>
           </a:p>
         </p:txBody>
@@ -13746,7 +13779,7 @@
           <a:p>
             <a:pPr algn="l"/>
             <a:r>
-              <a:rPr lang="en-US" sz="3200">
+              <a:rPr lang="en-US" sz="3200" dirty="0">
                 <a:solidFill>
                   <a:srgbClr val="FFFFFF"/>
                 </a:solidFill>
@@ -14249,26 +14282,39 @@
           </a:bodyPr>
           <a:lstStyle/>
           <a:p>
+            <a:pPr marL="0" indent="0">
+              <a:buNone/>
+            </a:pPr>
             <a:r>
-              <a:rPr lang="en-US" sz="2000"/>
+              <a:rPr lang="en-US" sz="2000" u="sng" dirty="0"/>
+              <a:t>Layered Architecture:</a:t>
+            </a:r>
+          </a:p>
+          <a:p>
+            <a:r>
+              <a:rPr lang="en-US" sz="2000" dirty="0"/>
               <a:t>Very common, low-cost, and simple architectural style</a:t>
             </a:r>
           </a:p>
           <a:p>
             <a:r>
-              <a:rPr lang="en-US" sz="2000"/>
-              <a:t>Architecture is structured by technical role, not domain</a:t>
+              <a:rPr lang="en-US" sz="2000" dirty="0"/>
+              <a:t>Architecture is structured by technical role -- </a:t>
             </a:r>
-          </a:p>
-          <a:p>
             <a:r>
-              <a:rPr lang="en-US" sz="2000"/>
+              <a:rPr lang="en-US" sz="2000" u="sng" dirty="0"/>
+              <a:t>not domain</a:t>
+            </a:r>
+          </a:p>
+          <a:p>
+            <a:r>
+              <a:rPr lang="en-US" sz="2000" dirty="0"/>
               <a:t>Isolation is key, avoid sink-hole antipatterns</a:t>
             </a:r>
           </a:p>
           <a:p>
             <a:r>
-              <a:rPr lang="en-US" sz="2000"/>
+              <a:rPr lang="en-US" sz="2000" dirty="0"/>
               <a:t>Be aware of testing and deployment downsides due to the coupled nature of this architecture</a:t>
             </a:r>
           </a:p>

</xml_diff>